<commit_message>
ppt + regisztráció tárolt eljárások
</commit_message>
<xml_diff>
--- a/PPT/AGORA.pptx
+++ b/PPT/AGORA.pptx
@@ -6,13 +6,16 @@
   </p:sldMasterIdLst>
   <p:sldIdLst>
     <p:sldId id="256" r:id="rId2"/>
-    <p:sldId id="257" r:id="rId3"/>
-    <p:sldId id="262" r:id="rId4"/>
-    <p:sldId id="258" r:id="rId5"/>
-    <p:sldId id="259" r:id="rId6"/>
-    <p:sldId id="261" r:id="rId7"/>
-    <p:sldId id="263" r:id="rId8"/>
-    <p:sldId id="260" r:id="rId9"/>
+    <p:sldId id="266" r:id="rId3"/>
+    <p:sldId id="257" r:id="rId4"/>
+    <p:sldId id="268" r:id="rId5"/>
+    <p:sldId id="258" r:id="rId6"/>
+    <p:sldId id="259" r:id="rId7"/>
+    <p:sldId id="261" r:id="rId8"/>
+    <p:sldId id="263" r:id="rId9"/>
+    <p:sldId id="267" r:id="rId10"/>
+    <p:sldId id="269" r:id="rId11"/>
+    <p:sldId id="260" r:id="rId12"/>
   </p:sldIdLst>
   <p:sldSz cx="9144000" cy="6858000" type="screen4x3"/>
   <p:notesSz cx="6858000" cy="9144000"/>
@@ -113,7 +116,7 @@
   </p:defaultTextStyle>
   <p:extLst>
     <p:ext uri="{EFAFB233-063F-42B5-8137-9DF3F51BA10A}">
-      <p15:sldGuideLst xmlns:p15="http://schemas.microsoft.com/office/powerpoint/2012/main" xmlns="">
+      <p15:sldGuideLst xmlns="" xmlns:p15="http://schemas.microsoft.com/office/powerpoint/2012/main">
         <p15:guide id="1" orient="horz" pos="2160">
           <p15:clr>
             <a:srgbClr val="A4A3A4"/>
@@ -3158,6 +3161,223 @@
 </p:sld>
 </file>
 
+<file path=ppt/slides/slide10.xml><?xml version="1.0" encoding="utf-8"?>
+<p:sld xmlns:a="http://schemas.openxmlformats.org/drawingml/2006/main" xmlns:r="http://schemas.openxmlformats.org/officeDocument/2006/relationships" xmlns:p="http://schemas.openxmlformats.org/presentationml/2006/main">
+  <p:cSld>
+    <p:spTree>
+      <p:nvGrpSpPr>
+        <p:cNvPr id="1" name=""/>
+        <p:cNvGrpSpPr/>
+        <p:nvPr/>
+      </p:nvGrpSpPr>
+      <p:grpSpPr>
+        <a:xfrm>
+          <a:off x="0" y="0"/>
+          <a:ext cx="0" cy="0"/>
+          <a:chOff x="0" y="0"/>
+          <a:chExt cx="0" cy="0"/>
+        </a:xfrm>
+      </p:grpSpPr>
+      <p:sp>
+        <p:nvSpPr>
+          <p:cNvPr id="2" name="Cím 1"/>
+          <p:cNvSpPr>
+            <a:spLocks noGrp="1"/>
+          </p:cNvSpPr>
+          <p:nvPr>
+            <p:ph type="title"/>
+          </p:nvPr>
+        </p:nvSpPr>
+        <p:spPr/>
+        <p:txBody>
+          <a:bodyPr/>
+          <a:lstStyle/>
+          <a:p>
+            <a:r>
+              <a:rPr lang="hu-HU" b="1" dirty="0" err="1" smtClean="0">
+                <a:latin typeface="IM FELL English" pitchFamily="2" charset="0"/>
+              </a:rPr>
+              <a:t>Future</a:t>
+            </a:r>
+            <a:r>
+              <a:rPr lang="hu-HU" b="1" dirty="0" smtClean="0">
+                <a:latin typeface="IM FELL English" pitchFamily="2" charset="0"/>
+              </a:rPr>
+              <a:t> </a:t>
+            </a:r>
+            <a:r>
+              <a:rPr lang="hu-HU" b="1" dirty="0" err="1" smtClean="0">
+                <a:latin typeface="IM FELL English" pitchFamily="2" charset="0"/>
+              </a:rPr>
+              <a:t>developments</a:t>
+            </a:r>
+            <a:endParaRPr lang="hu-HU" b="1" dirty="0">
+              <a:latin typeface="IM FELL English" pitchFamily="2" charset="0"/>
+            </a:endParaRPr>
+          </a:p>
+        </p:txBody>
+      </p:sp>
+      <p:sp>
+        <p:nvSpPr>
+          <p:cNvPr id="3" name="Tartalom helye 2"/>
+          <p:cNvSpPr>
+            <a:spLocks noGrp="1"/>
+          </p:cNvSpPr>
+          <p:nvPr>
+            <p:ph sz="half" idx="1"/>
+          </p:nvPr>
+        </p:nvSpPr>
+        <p:spPr>
+          <a:xfrm>
+            <a:off x="457200" y="1600200"/>
+            <a:ext cx="6257940" cy="4525963"/>
+          </a:xfrm>
+        </p:spPr>
+        <p:txBody>
+          <a:bodyPr/>
+          <a:lstStyle/>
+          <a:p>
+            <a:r>
+              <a:rPr lang="hu-HU" dirty="0" smtClean="0">
+                <a:latin typeface="IM FELL English" pitchFamily="2" charset="0"/>
+              </a:rPr>
+              <a:t>New </a:t>
+            </a:r>
+            <a:r>
+              <a:rPr lang="hu-HU" dirty="0" err="1" smtClean="0">
+                <a:latin typeface="IM FELL English" pitchFamily="2" charset="0"/>
+              </a:rPr>
+              <a:t>categories</a:t>
+            </a:r>
+            <a:endParaRPr lang="hu-HU" dirty="0" smtClean="0">
+              <a:latin typeface="IM FELL English" pitchFamily="2" charset="0"/>
+            </a:endParaRPr>
+          </a:p>
+          <a:p>
+            <a:r>
+              <a:rPr lang="hu-HU" dirty="0" err="1" smtClean="0">
+                <a:latin typeface="IM FELL English" pitchFamily="2" charset="0"/>
+              </a:rPr>
+              <a:t>Payment</a:t>
+            </a:r>
+            <a:r>
+              <a:rPr lang="hu-HU" dirty="0" smtClean="0">
+                <a:latin typeface="IM FELL English" pitchFamily="2" charset="0"/>
+              </a:rPr>
+              <a:t> </a:t>
+            </a:r>
+            <a:r>
+              <a:rPr lang="hu-HU" dirty="0" err="1" smtClean="0">
+                <a:latin typeface="IM FELL English" pitchFamily="2" charset="0"/>
+              </a:rPr>
+              <a:t>methods</a:t>
+            </a:r>
+            <a:endParaRPr lang="hu-HU" dirty="0" smtClean="0">
+              <a:latin typeface="IM FELL English" pitchFamily="2" charset="0"/>
+            </a:endParaRPr>
+          </a:p>
+          <a:p>
+            <a:r>
+              <a:rPr lang="hu-HU" dirty="0" err="1" smtClean="0">
+                <a:latin typeface="IM FELL English" pitchFamily="2" charset="0"/>
+              </a:rPr>
+              <a:t>Tips</a:t>
+            </a:r>
+            <a:r>
+              <a:rPr lang="hu-HU" dirty="0" smtClean="0">
+                <a:latin typeface="IM FELL English" pitchFamily="2" charset="0"/>
+              </a:rPr>
+              <a:t> </a:t>
+            </a:r>
+            <a:r>
+              <a:rPr lang="hu-HU" dirty="0" smtClean="0">
+                <a:latin typeface="IM FELL English" pitchFamily="2" charset="0"/>
+              </a:rPr>
+              <a:t>and </a:t>
+            </a:r>
+            <a:r>
+              <a:rPr lang="hu-HU" dirty="0" err="1" smtClean="0">
+                <a:latin typeface="IM FELL English" pitchFamily="2" charset="0"/>
+              </a:rPr>
+              <a:t>advice</a:t>
+            </a:r>
+            <a:endParaRPr lang="hu-HU" dirty="0">
+              <a:latin typeface="IM FELL English" pitchFamily="2" charset="0"/>
+            </a:endParaRPr>
+          </a:p>
+        </p:txBody>
+      </p:sp>
+    </p:spTree>
+  </p:cSld>
+  <p:clrMapOvr>
+    <a:masterClrMapping/>
+  </p:clrMapOvr>
+</p:sld>
+</file>
+
+<file path=ppt/slides/slide11.xml><?xml version="1.0" encoding="utf-8"?>
+<p:sld xmlns:a="http://schemas.openxmlformats.org/drawingml/2006/main" xmlns:r="http://schemas.openxmlformats.org/officeDocument/2006/relationships" xmlns:p="http://schemas.openxmlformats.org/presentationml/2006/main">
+  <p:cSld>
+    <p:spTree>
+      <p:nvGrpSpPr>
+        <p:cNvPr id="1" name=""/>
+        <p:cNvGrpSpPr/>
+        <p:nvPr/>
+      </p:nvGrpSpPr>
+      <p:grpSpPr>
+        <a:xfrm>
+          <a:off x="0" y="0"/>
+          <a:ext cx="0" cy="0"/>
+          <a:chOff x="0" y="0"/>
+          <a:chExt cx="0" cy="0"/>
+        </a:xfrm>
+      </p:grpSpPr>
+      <p:sp>
+        <p:nvSpPr>
+          <p:cNvPr id="2" name="Cím 1"/>
+          <p:cNvSpPr>
+            <a:spLocks noGrp="1"/>
+          </p:cNvSpPr>
+          <p:nvPr>
+            <p:ph type="ctrTitle"/>
+          </p:nvPr>
+        </p:nvSpPr>
+        <p:spPr>
+          <a:xfrm>
+            <a:off x="685800" y="2714620"/>
+            <a:ext cx="7772400" cy="1428760"/>
+          </a:xfrm>
+        </p:spPr>
+        <p:txBody>
+          <a:bodyPr/>
+          <a:lstStyle/>
+          <a:p>
+            <a:r>
+              <a:rPr lang="en-US" dirty="0" smtClean="0">
+                <a:latin typeface="IM FELL English" pitchFamily="2" charset="0"/>
+              </a:rPr>
+              <a:t>Thank you for your attention</a:t>
+            </a:r>
+            <a:r>
+              <a:rPr lang="hu-HU" dirty="0" smtClean="0">
+                <a:latin typeface="IM FELL English" pitchFamily="2" charset="0"/>
+              </a:rPr>
+              <a:t>!</a:t>
+            </a:r>
+            <a:endParaRPr lang="hu-HU" dirty="0">
+              <a:latin typeface="IM FELL English" pitchFamily="2" charset="0"/>
+            </a:endParaRPr>
+          </a:p>
+        </p:txBody>
+      </p:sp>
+    </p:spTree>
+  </p:cSld>
+  <p:clrMapOvr>
+    <a:masterClrMapping/>
+  </p:clrMapOvr>
+</p:sld>
+</file>
+
 <file path=ppt/slides/slide2.xml><?xml version="1.0" encoding="utf-8"?>
 <p:sld xmlns:a="http://schemas.openxmlformats.org/drawingml/2006/main" xmlns:r="http://schemas.openxmlformats.org/officeDocument/2006/relationships" xmlns:p="http://schemas.openxmlformats.org/presentationml/2006/main">
   <p:cSld>
@@ -3194,25 +3414,31 @@
               <a:rPr lang="hu-HU" b="1" dirty="0" err="1" smtClean="0">
                 <a:latin typeface="IM FELL English" pitchFamily="2" charset="0"/>
               </a:rPr>
-              <a:t>Purpose</a:t>
+              <a:t>About</a:t>
             </a:r>
             <a:r>
               <a:rPr lang="hu-HU" b="1" dirty="0" smtClean="0">
                 <a:latin typeface="IM FELL English" pitchFamily="2" charset="0"/>
               </a:rPr>
-              <a:t> of </a:t>
-            </a:r>
-            <a:r>
-              <a:rPr lang="hu-HU" b="1" dirty="0">
-                <a:latin typeface="IM FELL English" pitchFamily="2" charset="0"/>
-              </a:rPr>
-              <a:t>S</a:t>
+              <a:t> </a:t>
+            </a:r>
+            <a:r>
+              <a:rPr lang="hu-HU" b="1" dirty="0" err="1" smtClean="0">
+                <a:latin typeface="IM FELL English" pitchFamily="2" charset="0"/>
+              </a:rPr>
+              <a:t>the</a:t>
             </a:r>
             <a:r>
               <a:rPr lang="hu-HU" b="1" dirty="0" smtClean="0">
                 <a:latin typeface="IM FELL English" pitchFamily="2" charset="0"/>
               </a:rPr>
-              <a:t>oftware</a:t>
+              <a:t> </a:t>
+            </a:r>
+            <a:r>
+              <a:rPr lang="hu-HU" b="1" dirty="0" smtClean="0">
+                <a:latin typeface="IM FELL English" pitchFamily="2" charset="0"/>
+              </a:rPr>
+              <a:t>Software</a:t>
             </a:r>
             <a:endParaRPr lang="hu-HU" b="1" dirty="0">
               <a:latin typeface="IM FELL English" pitchFamily="2" charset="0"/>
@@ -3232,8 +3458,8 @@
         </p:nvSpPr>
         <p:spPr>
           <a:xfrm>
-            <a:off x="457200" y="2000240"/>
-            <a:ext cx="6829444" cy="4125923"/>
+            <a:off x="457200" y="1600200"/>
+            <a:ext cx="7543824" cy="4525963"/>
           </a:xfrm>
         </p:spPr>
         <p:txBody>
@@ -3241,46 +3467,16 @@
           <a:lstStyle/>
           <a:p>
             <a:r>
-              <a:rPr lang="hu-HU" dirty="0">
-                <a:latin typeface="IM FELL English" pitchFamily="2" charset="0"/>
-              </a:rPr>
-              <a:t>O</a:t>
-            </a:r>
-            <a:r>
-              <a:rPr lang="hu-HU" dirty="0" smtClean="0">
-                <a:latin typeface="IM FELL English" pitchFamily="2" charset="0"/>
-              </a:rPr>
-              <a:t>nline </a:t>
-            </a:r>
-            <a:r>
-              <a:rPr lang="hu-HU" dirty="0" err="1" smtClean="0">
-                <a:latin typeface="IM FELL English" pitchFamily="2" charset="0"/>
-              </a:rPr>
-              <a:t>marketplace</a:t>
-            </a:r>
-            <a:r>
-              <a:rPr lang="hu-HU" dirty="0" smtClean="0">
-                <a:latin typeface="IM FELL English" pitchFamily="2" charset="0"/>
-              </a:rPr>
-              <a:t> </a:t>
-            </a:r>
-            <a:r>
-              <a:rPr lang="hu-HU" dirty="0" err="1" smtClean="0">
-                <a:latin typeface="IM FELL English" pitchFamily="2" charset="0"/>
-              </a:rPr>
-              <a:t>for</a:t>
-            </a:r>
-            <a:r>
-              <a:rPr lang="hu-HU" dirty="0" smtClean="0">
-                <a:latin typeface="IM FELL English" pitchFamily="2" charset="0"/>
-              </a:rPr>
-              <a:t> </a:t>
-            </a:r>
-            <a:r>
-              <a:rPr lang="hu-HU" dirty="0" err="1" smtClean="0">
-                <a:latin typeface="IM FELL English" pitchFamily="2" charset="0"/>
-              </a:rPr>
-              <a:t>smallholders</a:t>
+              <a:rPr lang="en-US" dirty="0" smtClean="0">
+                <a:latin typeface="IM FELL English" pitchFamily="2" charset="0"/>
+              </a:rPr>
+              <a:t>It provides a solution to a lifelike, real </a:t>
+            </a:r>
+            <a:r>
+              <a:rPr lang="en-US" dirty="0" smtClean="0">
+                <a:latin typeface="IM FELL English" pitchFamily="2" charset="0"/>
+              </a:rPr>
+              <a:t>problem</a:t>
             </a:r>
             <a:endParaRPr lang="hu-HU" dirty="0" smtClean="0">
               <a:latin typeface="IM FELL English" pitchFamily="2" charset="0"/>
@@ -3288,40 +3484,16 @@
           </a:p>
           <a:p>
             <a:r>
-              <a:rPr lang="hu-HU" dirty="0" err="1">
-                <a:latin typeface="IM FELL English" pitchFamily="2" charset="0"/>
-              </a:rPr>
-              <a:t>E</a:t>
-            </a:r>
-            <a:r>
-              <a:rPr lang="hu-HU" dirty="0" err="1" smtClean="0">
-                <a:latin typeface="IM FELL English" pitchFamily="2" charset="0"/>
-              </a:rPr>
-              <a:t>asy</a:t>
-            </a:r>
-            <a:r>
-              <a:rPr lang="hu-HU" dirty="0" smtClean="0">
-                <a:latin typeface="IM FELL English" pitchFamily="2" charset="0"/>
-              </a:rPr>
-              <a:t> </a:t>
-            </a:r>
-            <a:r>
-              <a:rPr lang="hu-HU" dirty="0" err="1" smtClean="0">
-                <a:latin typeface="IM FELL English" pitchFamily="2" charset="0"/>
-              </a:rPr>
-              <a:t>buying</a:t>
-            </a:r>
-            <a:r>
-              <a:rPr lang="hu-HU" dirty="0" smtClean="0">
-                <a:latin typeface="IM FELL English" pitchFamily="2" charset="0"/>
-              </a:rPr>
-              <a:t> and </a:t>
-            </a:r>
-            <a:r>
-              <a:rPr lang="hu-HU" dirty="0" err="1" smtClean="0">
-                <a:latin typeface="IM FELL English" pitchFamily="2" charset="0"/>
-              </a:rPr>
-              <a:t>selling</a:t>
+              <a:rPr lang="en-US" dirty="0" smtClean="0">
+                <a:latin typeface="IM FELL English" pitchFamily="2" charset="0"/>
+              </a:rPr>
+              <a:t>It implements data storage and management </a:t>
+            </a:r>
+            <a:r>
+              <a:rPr lang="en-US" dirty="0" smtClean="0">
+                <a:latin typeface="IM FELL English" pitchFamily="2" charset="0"/>
+              </a:rPr>
+              <a:t>functions</a:t>
             </a:r>
             <a:endParaRPr lang="hu-HU" dirty="0" smtClean="0">
               <a:latin typeface="IM FELL English" pitchFamily="2" charset="0"/>
@@ -3329,22 +3501,34 @@
           </a:p>
           <a:p>
             <a:r>
-              <a:rPr lang="hu-HU" dirty="0">
-                <a:latin typeface="IM FELL English" pitchFamily="2" charset="0"/>
-              </a:rPr>
-              <a:t>G</a:t>
-            </a:r>
-            <a:r>
-              <a:rPr lang="en-US" dirty="0" err="1" smtClean="0">
-                <a:latin typeface="IM FELL English" pitchFamily="2" charset="0"/>
-              </a:rPr>
-              <a:t>ood</a:t>
-            </a:r>
-            <a:r>
-              <a:rPr lang="en-US" dirty="0" smtClean="0">
-                <a:latin typeface="IM FELL English" pitchFamily="2" charset="0"/>
-              </a:rPr>
-              <a:t> quality and environmentally friendly products</a:t>
+              <a:rPr lang="hu-HU" dirty="0" err="1" smtClean="0">
+                <a:latin typeface="IM FELL English" pitchFamily="2" charset="0"/>
+              </a:rPr>
+              <a:t>Pure</a:t>
+            </a:r>
+            <a:r>
+              <a:rPr lang="hu-HU" dirty="0" smtClean="0">
+                <a:latin typeface="IM FELL English" pitchFamily="2" charset="0"/>
+              </a:rPr>
+              <a:t> </a:t>
+            </a:r>
+            <a:r>
+              <a:rPr lang="hu-HU" dirty="0" err="1" smtClean="0">
+                <a:latin typeface="IM FELL English" pitchFamily="2" charset="0"/>
+              </a:rPr>
+              <a:t>source</a:t>
+            </a:r>
+            <a:r>
+              <a:rPr lang="hu-HU" dirty="0" smtClean="0">
+                <a:latin typeface="IM FELL English" pitchFamily="2" charset="0"/>
+              </a:rPr>
+              <a:t> </a:t>
+            </a:r>
+            <a:r>
+              <a:rPr lang="hu-HU" dirty="0" err="1" smtClean="0">
+                <a:latin typeface="IM FELL English" pitchFamily="2" charset="0"/>
+              </a:rPr>
+              <a:t>code</a:t>
             </a:r>
             <a:endParaRPr lang="hu-HU" dirty="0" smtClean="0">
               <a:latin typeface="IM FELL English" pitchFamily="2" charset="0"/>
@@ -3355,7 +3539,36 @@
               <a:rPr lang="en-US" dirty="0" smtClean="0">
                 <a:latin typeface="IM FELL English" pitchFamily="2" charset="0"/>
               </a:rPr>
-              <a:t>Sellers can have a larger customer base</a:t>
+              <a:t>Can be used on both mobile and desktop </a:t>
+            </a:r>
+            <a:r>
+              <a:rPr lang="en-US" dirty="0" smtClean="0">
+                <a:latin typeface="IM FELL English" pitchFamily="2" charset="0"/>
+              </a:rPr>
+              <a:t>devices</a:t>
+            </a:r>
+            <a:endParaRPr lang="hu-HU" dirty="0" smtClean="0">
+              <a:latin typeface="IM FELL English" pitchFamily="2" charset="0"/>
+            </a:endParaRPr>
+          </a:p>
+          <a:p>
+            <a:r>
+              <a:rPr lang="hu-HU" dirty="0" err="1" smtClean="0">
+                <a:latin typeface="IM FELL English" pitchFamily="2" charset="0"/>
+              </a:rPr>
+              <a:t>RESTful</a:t>
+            </a:r>
+            <a:r>
+              <a:rPr lang="hu-HU" dirty="0" smtClean="0">
+                <a:latin typeface="IM FELL English" pitchFamily="2" charset="0"/>
+              </a:rPr>
+              <a:t> </a:t>
+            </a:r>
+            <a:r>
+              <a:rPr lang="hu-HU" dirty="0" err="1" smtClean="0">
+                <a:latin typeface="IM FELL English" pitchFamily="2" charset="0"/>
+              </a:rPr>
+              <a:t>architecture</a:t>
             </a:r>
             <a:endParaRPr lang="hu-HU" dirty="0">
               <a:latin typeface="IM FELL English" pitchFamily="2" charset="0"/>
@@ -3407,13 +3620,25 @@
               <a:rPr lang="hu-HU" b="1" dirty="0" err="1" smtClean="0">
                 <a:latin typeface="IM FELL English" pitchFamily="2" charset="0"/>
               </a:rPr>
-              <a:t>Architecture</a:t>
+              <a:t>Purpose</a:t>
             </a:r>
             <a:r>
               <a:rPr lang="hu-HU" b="1" dirty="0" smtClean="0">
                 <a:latin typeface="IM FELL English" pitchFamily="2" charset="0"/>
               </a:rPr>
-              <a:t> of Software</a:t>
+              <a:t> of </a:t>
+            </a:r>
+            <a:r>
+              <a:rPr lang="hu-HU" b="1" dirty="0">
+                <a:latin typeface="IM FELL English" pitchFamily="2" charset="0"/>
+              </a:rPr>
+              <a:t>S</a:t>
+            </a:r>
+            <a:r>
+              <a:rPr lang="hu-HU" b="1" dirty="0" smtClean="0">
+                <a:latin typeface="IM FELL English" pitchFamily="2" charset="0"/>
+              </a:rPr>
+              <a:t>oftware</a:t>
             </a:r>
             <a:endParaRPr lang="hu-HU" b="1" dirty="0">
               <a:latin typeface="IM FELL English" pitchFamily="2" charset="0"/>
@@ -3423,76 +3648,142 @@
       </p:sp>
       <p:sp>
         <p:nvSpPr>
-          <p:cNvPr id="3" name="Szövegdoboz 2"/>
-          <p:cNvSpPr txBox="1"/>
-          <p:nvPr/>
+          <p:cNvPr id="3" name="Tartalom helye 2"/>
+          <p:cNvSpPr>
+            <a:spLocks noGrp="1"/>
+          </p:cNvSpPr>
+          <p:nvPr>
+            <p:ph sz="half" idx="1"/>
+          </p:nvPr>
         </p:nvSpPr>
         <p:spPr>
           <a:xfrm>
-            <a:off x="357158" y="1643050"/>
-            <a:ext cx="6215106" cy="1754326"/>
+            <a:off x="457200" y="2000240"/>
+            <a:ext cx="6829444" cy="4125923"/>
           </a:xfrm>
-          <a:prstGeom prst="rect">
-            <a:avLst/>
-          </a:prstGeom>
-          <a:noFill/>
         </p:spPr>
         <p:txBody>
-          <a:bodyPr wrap="square" rtlCol="0">
-            <a:spAutoFit/>
-          </a:bodyPr>
-          <a:lstStyle/>
-          <a:p>
-            <a:pPr>
-              <a:buFont typeface="Arial" pitchFamily="34" charset="0"/>
-              <a:buChar char="•"/>
-            </a:pPr>
-            <a:r>
-              <a:rPr lang="hu-HU" sz="3600" dirty="0" err="1" smtClean="0">
-                <a:latin typeface="IM FELL English" pitchFamily="2" charset="0"/>
-              </a:rPr>
-              <a:t>Backend</a:t>
-            </a:r>
-            <a:endParaRPr lang="hu-HU" sz="3600" dirty="0" smtClean="0">
+          <a:bodyPr/>
+          <a:lstStyle/>
+          <a:p>
+            <a:r>
+              <a:rPr lang="hu-HU" dirty="0">
+                <a:latin typeface="IM FELL English" pitchFamily="2" charset="0"/>
+              </a:rPr>
+              <a:t>O</a:t>
+            </a:r>
+            <a:r>
+              <a:rPr lang="hu-HU" dirty="0" smtClean="0">
+                <a:latin typeface="IM FELL English" pitchFamily="2" charset="0"/>
+              </a:rPr>
+              <a:t>nline </a:t>
+            </a:r>
+            <a:r>
+              <a:rPr lang="hu-HU" dirty="0" err="1" smtClean="0">
+                <a:latin typeface="IM FELL English" pitchFamily="2" charset="0"/>
+              </a:rPr>
+              <a:t>marketplace</a:t>
+            </a:r>
+            <a:r>
+              <a:rPr lang="hu-HU" dirty="0" smtClean="0">
+                <a:latin typeface="IM FELL English" pitchFamily="2" charset="0"/>
+              </a:rPr>
+              <a:t> </a:t>
+            </a:r>
+            <a:r>
+              <a:rPr lang="hu-HU" dirty="0" err="1" smtClean="0">
+                <a:latin typeface="IM FELL English" pitchFamily="2" charset="0"/>
+              </a:rPr>
+              <a:t>for</a:t>
+            </a:r>
+            <a:r>
+              <a:rPr lang="hu-HU" dirty="0" smtClean="0">
+                <a:latin typeface="IM FELL English" pitchFamily="2" charset="0"/>
+              </a:rPr>
+              <a:t> </a:t>
+            </a:r>
+            <a:r>
+              <a:rPr lang="hu-HU" dirty="0" err="1" smtClean="0">
+                <a:latin typeface="IM FELL English" pitchFamily="2" charset="0"/>
+              </a:rPr>
+              <a:t>smallholders</a:t>
+            </a:r>
+            <a:endParaRPr lang="hu-HU" dirty="0" smtClean="0">
               <a:latin typeface="IM FELL English" pitchFamily="2" charset="0"/>
             </a:endParaRPr>
           </a:p>
           <a:p>
-            <a:pPr>
-              <a:buFont typeface="Arial" pitchFamily="34" charset="0"/>
-              <a:buChar char="•"/>
-            </a:pPr>
-            <a:r>
-              <a:rPr lang="hu-HU" sz="3600" dirty="0" smtClean="0">
-                <a:latin typeface="IM FELL English" pitchFamily="2" charset="0"/>
-              </a:rPr>
-              <a:t>Frontend</a:t>
-            </a:r>
-          </a:p>
-          <a:p>
-            <a:pPr>
-              <a:buFont typeface="Arial" pitchFamily="34" charset="0"/>
-              <a:buChar char="•"/>
-            </a:pPr>
-            <a:r>
-              <a:rPr lang="hu-HU" sz="3600" dirty="0" err="1" smtClean="0">
-                <a:latin typeface="IM FELL English" pitchFamily="2" charset="0"/>
-              </a:rPr>
-              <a:t>MySQL</a:t>
-            </a:r>
-            <a:r>
-              <a:rPr lang="hu-HU" sz="3600" dirty="0" smtClean="0">
+            <a:r>
+              <a:rPr lang="hu-HU" dirty="0" err="1">
+                <a:latin typeface="IM FELL English" pitchFamily="2" charset="0"/>
+              </a:rPr>
+              <a:t>E</a:t>
+            </a:r>
+            <a:r>
+              <a:rPr lang="hu-HU" dirty="0" err="1" smtClean="0">
+                <a:latin typeface="IM FELL English" pitchFamily="2" charset="0"/>
+              </a:rPr>
+              <a:t>asy</a:t>
+            </a:r>
+            <a:r>
+              <a:rPr lang="hu-HU" dirty="0" smtClean="0">
                 <a:latin typeface="IM FELL English" pitchFamily="2" charset="0"/>
               </a:rPr>
               <a:t> </a:t>
             </a:r>
             <a:r>
-              <a:rPr lang="hu-HU" sz="3600" dirty="0" err="1" smtClean="0">
-                <a:latin typeface="IM FELL English" pitchFamily="2" charset="0"/>
-              </a:rPr>
-              <a:t>database</a:t>
-            </a:r>
-            <a:endParaRPr lang="hu-HU" sz="3600" dirty="0">
+              <a:rPr lang="hu-HU" dirty="0" err="1" smtClean="0">
+                <a:latin typeface="IM FELL English" pitchFamily="2" charset="0"/>
+              </a:rPr>
+              <a:t>buying</a:t>
+            </a:r>
+            <a:r>
+              <a:rPr lang="hu-HU" dirty="0" smtClean="0">
+                <a:latin typeface="IM FELL English" pitchFamily="2" charset="0"/>
+              </a:rPr>
+              <a:t> and </a:t>
+            </a:r>
+            <a:r>
+              <a:rPr lang="hu-HU" dirty="0" err="1" smtClean="0">
+                <a:latin typeface="IM FELL English" pitchFamily="2" charset="0"/>
+              </a:rPr>
+              <a:t>selling</a:t>
+            </a:r>
+            <a:endParaRPr lang="hu-HU" dirty="0" smtClean="0">
+              <a:latin typeface="IM FELL English" pitchFamily="2" charset="0"/>
+            </a:endParaRPr>
+          </a:p>
+          <a:p>
+            <a:r>
+              <a:rPr lang="hu-HU" dirty="0">
+                <a:latin typeface="IM FELL English" pitchFamily="2" charset="0"/>
+              </a:rPr>
+              <a:t>G</a:t>
+            </a:r>
+            <a:r>
+              <a:rPr lang="en-US" dirty="0" err="1" smtClean="0">
+                <a:latin typeface="IM FELL English" pitchFamily="2" charset="0"/>
+              </a:rPr>
+              <a:t>ood</a:t>
+            </a:r>
+            <a:r>
+              <a:rPr lang="en-US" dirty="0" smtClean="0">
+                <a:latin typeface="IM FELL English" pitchFamily="2" charset="0"/>
+              </a:rPr>
+              <a:t> quality and environmentally friendly products</a:t>
+            </a:r>
+            <a:endParaRPr lang="hu-HU" dirty="0" smtClean="0">
+              <a:latin typeface="IM FELL English" pitchFamily="2" charset="0"/>
+            </a:endParaRPr>
+          </a:p>
+          <a:p>
+            <a:r>
+              <a:rPr lang="en-US" dirty="0" smtClean="0">
+                <a:latin typeface="IM FELL English" pitchFamily="2" charset="0"/>
+              </a:rPr>
+              <a:t>Sellers can have a larger customer base</a:t>
+            </a:r>
+            <a:endParaRPr lang="hu-HU" dirty="0">
               <a:latin typeface="IM FELL English" pitchFamily="2" charset="0"/>
             </a:endParaRPr>
           </a:p>
@@ -3535,164 +3826,89 @@
         </p:nvSpPr>
         <p:spPr/>
         <p:txBody>
+          <a:bodyPr/>
+          <a:lstStyle/>
+          <a:p>
+            <a:r>
+              <a:rPr lang="hu-HU" b="1" dirty="0" err="1" smtClean="0">
+                <a:latin typeface="IM FELL English" pitchFamily="2" charset="0"/>
+              </a:rPr>
+              <a:t>Architecture</a:t>
+            </a:r>
+            <a:r>
+              <a:rPr lang="hu-HU" b="1" dirty="0" smtClean="0">
+                <a:latin typeface="IM FELL English" pitchFamily="2" charset="0"/>
+              </a:rPr>
+              <a:t> of Software</a:t>
+            </a:r>
+            <a:endParaRPr lang="hu-HU" b="1" dirty="0">
+              <a:latin typeface="IM FELL English" pitchFamily="2" charset="0"/>
+            </a:endParaRPr>
+          </a:p>
+        </p:txBody>
+      </p:sp>
+      <p:sp>
+        <p:nvSpPr>
+          <p:cNvPr id="3" name="Tartalom helye 2"/>
+          <p:cNvSpPr>
+            <a:spLocks noGrp="1"/>
+          </p:cNvSpPr>
+          <p:nvPr>
+            <p:ph sz="half" idx="1"/>
+          </p:nvPr>
+        </p:nvSpPr>
+        <p:spPr>
+          <a:xfrm>
+            <a:off x="457200" y="1600200"/>
+            <a:ext cx="5543560" cy="4525963"/>
+          </a:xfrm>
+        </p:spPr>
+        <p:txBody>
           <a:bodyPr>
             <a:normAutofit/>
           </a:bodyPr>
           <a:lstStyle/>
           <a:p>
             <a:r>
-              <a:rPr lang="hu-HU" dirty="0" smtClean="0">
-                <a:latin typeface="IM FELL English" pitchFamily="2" charset="0"/>
-              </a:rPr>
-              <a:t> </a:t>
-            </a:r>
-            <a:r>
-              <a:rPr lang="hu-HU" b="1" dirty="0" err="1" smtClean="0">
-                <a:latin typeface="IM FELL English" pitchFamily="2" charset="0"/>
-              </a:rPr>
-              <a:t>B</a:t>
-            </a:r>
-            <a:r>
-              <a:rPr lang="hu-HU" b="1" dirty="0" err="1" smtClean="0">
-                <a:latin typeface="IM FELL English" pitchFamily="2" charset="0"/>
-              </a:rPr>
-              <a:t>ackend</a:t>
-            </a:r>
-            <a:endParaRPr lang="hu-HU" b="1" dirty="0">
+              <a:rPr lang="hu-HU" sz="3200" dirty="0" err="1" smtClean="0">
+                <a:latin typeface="IM FELL English" pitchFamily="2" charset="0"/>
+              </a:rPr>
+              <a:t>Backend</a:t>
+            </a:r>
+            <a:endParaRPr lang="hu-HU" sz="3200" dirty="0" smtClean="0">
               <a:latin typeface="IM FELL English" pitchFamily="2" charset="0"/>
             </a:endParaRPr>
           </a:p>
-        </p:txBody>
-      </p:sp>
-      <p:sp>
-        <p:nvSpPr>
-          <p:cNvPr id="3" name="Tartalom helye 2"/>
-          <p:cNvSpPr>
-            <a:spLocks noGrp="1"/>
-          </p:cNvSpPr>
-          <p:nvPr>
-            <p:ph sz="half" idx="1"/>
-          </p:nvPr>
-        </p:nvSpPr>
-        <p:spPr/>
-        <p:txBody>
-          <a:bodyPr/>
-          <a:lstStyle/>
-          <a:p>
-            <a:r>
-              <a:rPr lang="hu-HU" dirty="0" err="1" smtClean="0">
-                <a:latin typeface="IM FELL English" pitchFamily="2" charset="0"/>
-              </a:rPr>
-              <a:t>NodeJS</a:t>
-            </a:r>
-            <a:endParaRPr lang="hu-HU" dirty="0" smtClean="0">
+          <a:p>
+            <a:r>
+              <a:rPr lang="hu-HU" sz="3200" dirty="0" smtClean="0">
+                <a:latin typeface="IM FELL English" pitchFamily="2" charset="0"/>
+              </a:rPr>
+              <a:t>Frontend</a:t>
+            </a:r>
+          </a:p>
+          <a:p>
+            <a:r>
+              <a:rPr lang="hu-HU" sz="3200" dirty="0" err="1" smtClean="0">
+                <a:latin typeface="IM FELL English" pitchFamily="2" charset="0"/>
+              </a:rPr>
+              <a:t>MySQL</a:t>
+            </a:r>
+            <a:r>
+              <a:rPr lang="hu-HU" sz="3200" dirty="0" smtClean="0">
+                <a:latin typeface="IM FELL English" pitchFamily="2" charset="0"/>
+              </a:rPr>
+              <a:t> </a:t>
+            </a:r>
+            <a:r>
+              <a:rPr lang="hu-HU" sz="3200" dirty="0" err="1" smtClean="0">
+                <a:latin typeface="IM FELL English" pitchFamily="2" charset="0"/>
+              </a:rPr>
+              <a:t>database</a:t>
+            </a:r>
+            <a:endParaRPr lang="hu-HU" sz="3200" dirty="0">
               <a:latin typeface="IM FELL English" pitchFamily="2" charset="0"/>
             </a:endParaRPr>
-          </a:p>
-          <a:p>
-            <a:r>
-              <a:rPr lang="hu-HU" dirty="0" smtClean="0">
-                <a:latin typeface="IM FELL English" pitchFamily="2" charset="0"/>
-              </a:rPr>
-              <a:t>Express</a:t>
-            </a:r>
-            <a:endParaRPr lang="hu-HU" dirty="0" smtClean="0">
-              <a:latin typeface="IM FELL English" pitchFamily="2" charset="0"/>
-            </a:endParaRPr>
-          </a:p>
-          <a:p>
-            <a:r>
-              <a:rPr lang="hu-HU" dirty="0" smtClean="0">
-                <a:latin typeface="IM FELL English" pitchFamily="2" charset="0"/>
-              </a:rPr>
-              <a:t>API </a:t>
-            </a:r>
-          </a:p>
-          <a:p>
-            <a:r>
-              <a:rPr lang="hu-HU" dirty="0" err="1" smtClean="0">
-                <a:latin typeface="IM FELL English" pitchFamily="2" charset="0"/>
-              </a:rPr>
-              <a:t>Authentication</a:t>
-            </a:r>
-            <a:endParaRPr lang="hu-HU" dirty="0" smtClean="0">
-              <a:latin typeface="IM FELL English" pitchFamily="2" charset="0"/>
-            </a:endParaRPr>
-          </a:p>
-          <a:p>
-            <a:pPr lvl="1"/>
-            <a:r>
-              <a:rPr lang="hu-HU" dirty="0" smtClean="0">
-                <a:latin typeface="IM FELL English" pitchFamily="2" charset="0"/>
-              </a:rPr>
-              <a:t>JSON</a:t>
-            </a:r>
-          </a:p>
-          <a:p>
-            <a:pPr lvl="1"/>
-            <a:r>
-              <a:rPr lang="hu-HU" dirty="0" smtClean="0">
-                <a:latin typeface="IM FELL English" pitchFamily="2" charset="0"/>
-              </a:rPr>
-              <a:t>JWT</a:t>
-            </a:r>
-            <a:endParaRPr lang="hu-HU" dirty="0" smtClean="0">
-              <a:latin typeface="IM FELL English" pitchFamily="2" charset="0"/>
-            </a:endParaRPr>
-          </a:p>
-          <a:p>
-            <a:r>
-              <a:rPr lang="hu-HU" dirty="0" err="1" smtClean="0">
-                <a:latin typeface="IM FELL English" pitchFamily="2" charset="0"/>
-              </a:rPr>
-              <a:t>MySQL</a:t>
-            </a:r>
-            <a:r>
-              <a:rPr lang="hu-HU" dirty="0" smtClean="0">
-                <a:latin typeface="IM FELL English" pitchFamily="2" charset="0"/>
-              </a:rPr>
-              <a:t> </a:t>
-            </a:r>
-            <a:r>
-              <a:rPr lang="hu-HU" dirty="0" err="1" smtClean="0">
-                <a:latin typeface="IM FELL English" pitchFamily="2" charset="0"/>
-              </a:rPr>
-              <a:t>MariaDB</a:t>
-            </a:r>
-            <a:endParaRPr lang="hu-HU" dirty="0" smtClean="0">
-              <a:latin typeface="IM FELL English" pitchFamily="2" charset="0"/>
-            </a:endParaRPr>
-          </a:p>
-          <a:p>
-            <a:pPr lvl="1"/>
-            <a:endParaRPr lang="hu-HU" dirty="0" smtClean="0">
-              <a:latin typeface="IM FELL English" pitchFamily="2" charset="0"/>
-            </a:endParaRPr>
-          </a:p>
-          <a:p>
-            <a:pPr lvl="1"/>
-            <a:endParaRPr lang="hu-HU" dirty="0" smtClean="0">
-              <a:latin typeface="IM FELL English" pitchFamily="2" charset="0"/>
-            </a:endParaRPr>
-          </a:p>
-        </p:txBody>
-      </p:sp>
-      <p:sp>
-        <p:nvSpPr>
-          <p:cNvPr id="6" name="Tartalom helye 5"/>
-          <p:cNvSpPr>
-            <a:spLocks noGrp="1"/>
-          </p:cNvSpPr>
-          <p:nvPr>
-            <p:ph sz="half" idx="2"/>
-          </p:nvPr>
-        </p:nvSpPr>
-        <p:spPr/>
-        <p:txBody>
-          <a:bodyPr/>
-          <a:lstStyle/>
-          <a:p>
-            <a:endParaRPr lang="hu-HU"/>
           </a:p>
         </p:txBody>
       </p:sp>
@@ -3745,12 +3961,14 @@
               <a:t> </a:t>
             </a:r>
             <a:r>
-              <a:rPr lang="hu-HU" b="1" dirty="0" smtClean="0">
-                <a:latin typeface="IM FELL English" pitchFamily="2" charset="0"/>
-              </a:rPr>
-              <a:t>Frontend</a:t>
-            </a:r>
-            <a:endParaRPr lang="hu-HU" b="1" dirty="0"/>
+              <a:rPr lang="hu-HU" b="1" dirty="0" err="1" smtClean="0">
+                <a:latin typeface="IM FELL English" pitchFamily="2" charset="0"/>
+              </a:rPr>
+              <a:t>Backend</a:t>
+            </a:r>
+            <a:endParaRPr lang="hu-HU" b="1" dirty="0">
+              <a:latin typeface="IM FELL English" pitchFamily="2" charset="0"/>
+            </a:endParaRPr>
           </a:p>
         </p:txBody>
       </p:sp>
@@ -3773,19 +3991,7 @@
               <a:rPr lang="hu-HU" dirty="0" err="1" smtClean="0">
                 <a:latin typeface="IM FELL English" pitchFamily="2" charset="0"/>
               </a:rPr>
-              <a:t>Angular</a:t>
-            </a:r>
-            <a:r>
-              <a:rPr lang="hu-HU" dirty="0" smtClean="0">
-                <a:latin typeface="IM FELL English" pitchFamily="2" charset="0"/>
-              </a:rPr>
-              <a:t>, </a:t>
-            </a:r>
-            <a:r>
-              <a:rPr lang="hu-HU" dirty="0" err="1" smtClean="0">
-                <a:latin typeface="IM FELL English" pitchFamily="2" charset="0"/>
-              </a:rPr>
-              <a:t>TypeScript</a:t>
+              <a:t>NodeJS</a:t>
             </a:r>
             <a:endParaRPr lang="hu-HU" dirty="0" smtClean="0">
               <a:latin typeface="IM FELL English" pitchFamily="2" charset="0"/>
@@ -3793,123 +3999,105 @@
           </a:p>
           <a:p>
             <a:r>
+              <a:rPr lang="hu-HU" dirty="0" smtClean="0">
+                <a:latin typeface="IM FELL English" pitchFamily="2" charset="0"/>
+              </a:rPr>
+              <a:t>Express</a:t>
+            </a:r>
+          </a:p>
+          <a:p>
+            <a:r>
+              <a:rPr lang="hu-HU" dirty="0" smtClean="0">
+                <a:latin typeface="IM FELL English" pitchFamily="2" charset="0"/>
+              </a:rPr>
+              <a:t>API </a:t>
+            </a:r>
+          </a:p>
+          <a:p>
+            <a:r>
               <a:rPr lang="hu-HU" dirty="0" err="1" smtClean="0">
                 <a:latin typeface="IM FELL English" pitchFamily="2" charset="0"/>
               </a:rPr>
-              <a:t>B</a:t>
-            </a:r>
-            <a:r>
-              <a:rPr lang="hu-HU" dirty="0" err="1" smtClean="0">
-                <a:latin typeface="IM FELL English" pitchFamily="2" charset="0"/>
-              </a:rPr>
-              <a:t>ootstrap</a:t>
-            </a:r>
-            <a:r>
-              <a:rPr lang="hu-HU" dirty="0" smtClean="0">
-                <a:latin typeface="IM FELL English" pitchFamily="2" charset="0"/>
-              </a:rPr>
-              <a:t> </a:t>
-            </a:r>
-            <a:r>
-              <a:rPr lang="hu-HU" dirty="0" err="1" smtClean="0">
-                <a:latin typeface="IM FELL English" pitchFamily="2" charset="0"/>
-              </a:rPr>
-              <a:t>scss</a:t>
-            </a:r>
-            <a:r>
-              <a:rPr lang="hu-HU" dirty="0" smtClean="0">
-                <a:latin typeface="IM FELL English" pitchFamily="2" charset="0"/>
-              </a:rPr>
-              <a:t> </a:t>
-            </a:r>
-            <a:r>
-              <a:rPr lang="hu-HU" dirty="0" err="1" smtClean="0">
-                <a:latin typeface="IM FELL English" pitchFamily="2" charset="0"/>
-              </a:rPr>
-              <a:t>directory</a:t>
+              <a:t>Authentication</a:t>
             </a:r>
             <a:endParaRPr lang="hu-HU" dirty="0" smtClean="0">
               <a:latin typeface="IM FELL English" pitchFamily="2" charset="0"/>
             </a:endParaRPr>
           </a:p>
           <a:p>
+            <a:pPr lvl="1"/>
             <a:r>
               <a:rPr lang="hu-HU" dirty="0" smtClean="0">
                 <a:latin typeface="IM FELL English" pitchFamily="2" charset="0"/>
               </a:rPr>
-              <a:t>Mobile and computer </a:t>
-            </a:r>
+              <a:t>JSON</a:t>
+            </a:r>
+          </a:p>
+          <a:p>
+            <a:pPr lvl="1"/>
+            <a:r>
+              <a:rPr lang="hu-HU" dirty="0" smtClean="0">
+                <a:latin typeface="IM FELL English" pitchFamily="2" charset="0"/>
+              </a:rPr>
+              <a:t>JWT</a:t>
+            </a:r>
+          </a:p>
+          <a:p>
             <a:r>
               <a:rPr lang="hu-HU" dirty="0" err="1" smtClean="0">
                 <a:latin typeface="IM FELL English" pitchFamily="2" charset="0"/>
               </a:rPr>
-              <a:t>view</a:t>
+              <a:t>MySQL</a:t>
+            </a:r>
+            <a:r>
+              <a:rPr lang="hu-HU" dirty="0" smtClean="0">
+                <a:latin typeface="IM FELL English" pitchFamily="2" charset="0"/>
+              </a:rPr>
+              <a:t> </a:t>
+            </a:r>
+            <a:r>
+              <a:rPr lang="hu-HU" dirty="0" err="1" smtClean="0">
+                <a:latin typeface="IM FELL English" pitchFamily="2" charset="0"/>
+              </a:rPr>
+              <a:t>MariaDB</a:t>
             </a:r>
             <a:endParaRPr lang="hu-HU" dirty="0" smtClean="0">
               <a:latin typeface="IM FELL English" pitchFamily="2" charset="0"/>
             </a:endParaRPr>
           </a:p>
           <a:p>
-            <a:r>
-              <a:rPr lang="hu-HU" dirty="0" err="1" smtClean="0">
-                <a:latin typeface="IM FELL English" pitchFamily="2" charset="0"/>
-              </a:rPr>
-              <a:t>Components</a:t>
-            </a:r>
+            <a:pPr lvl="1"/>
             <a:endParaRPr lang="hu-HU" dirty="0" smtClean="0">
               <a:latin typeface="IM FELL English" pitchFamily="2" charset="0"/>
             </a:endParaRPr>
           </a:p>
           <a:p>
-            <a:r>
-              <a:rPr lang="hu-HU" dirty="0" err="1" smtClean="0">
-                <a:latin typeface="IM FELL English" pitchFamily="2" charset="0"/>
-              </a:rPr>
-              <a:t>HttpClient</a:t>
-            </a:r>
-            <a:r>
-              <a:rPr lang="hu-HU" dirty="0" smtClean="0">
-                <a:latin typeface="IM FELL English" pitchFamily="2" charset="0"/>
-              </a:rPr>
-              <a:t> service</a:t>
-            </a:r>
-          </a:p>
-          <a:p>
-            <a:r>
-              <a:rPr lang="hu-HU" dirty="0" err="1" smtClean="0">
-                <a:latin typeface="IM FELL English" pitchFamily="2" charset="0"/>
-              </a:rPr>
-              <a:t>Validation</a:t>
-            </a:r>
-            <a:endParaRPr lang="hu-HU" dirty="0">
+            <a:pPr lvl="1"/>
+            <a:endParaRPr lang="hu-HU" dirty="0" smtClean="0">
               <a:latin typeface="IM FELL English" pitchFamily="2" charset="0"/>
             </a:endParaRPr>
           </a:p>
         </p:txBody>
       </p:sp>
-      <p:pic>
-        <p:nvPicPr>
-          <p:cNvPr id="7" name="Tartalom helye 6" descr="http get.png"/>
-          <p:cNvPicPr>
-            <a:picLocks noGrp="1" noChangeAspect="1"/>
-          </p:cNvPicPr>
+      <p:sp>
+        <p:nvSpPr>
+          <p:cNvPr id="6" name="Tartalom helye 5"/>
+          <p:cNvSpPr>
+            <a:spLocks noGrp="1"/>
+          </p:cNvSpPr>
           <p:nvPr>
             <p:ph sz="half" idx="2"/>
           </p:nvPr>
-        </p:nvPicPr>
-        <p:blipFill>
-          <a:blip r:embed="rId2"/>
-          <a:stretch>
-            <a:fillRect/>
-          </a:stretch>
-        </p:blipFill>
-        <p:spPr>
-          <a:xfrm>
-            <a:off x="4500562" y="2357430"/>
-            <a:ext cx="4357717" cy="2214577"/>
-          </a:xfrm>
-        </p:spPr>
-      </p:pic>
+        </p:nvSpPr>
+        <p:spPr/>
+        <p:txBody>
+          <a:bodyPr/>
+          <a:lstStyle/>
+          <a:p>
+            <a:endParaRPr lang="hu-HU"/>
+          </a:p>
+        </p:txBody>
+      </p:sp>
     </p:spTree>
   </p:cSld>
   <p:clrMapOvr>
@@ -3953,22 +4141,16 @@
           <a:lstStyle/>
           <a:p>
             <a:r>
-              <a:rPr lang="hu-HU" b="1" dirty="0" err="1" smtClean="0">
-                <a:latin typeface="IM FELL English" pitchFamily="2" charset="0"/>
-              </a:rPr>
-              <a:t>MySQL</a:t>
+              <a:rPr lang="hu-HU" dirty="0" smtClean="0">
+                <a:latin typeface="IM FELL English" pitchFamily="2" charset="0"/>
+              </a:rPr>
+              <a:t> </a:t>
             </a:r>
             <a:r>
               <a:rPr lang="hu-HU" b="1" dirty="0" smtClean="0">
                 <a:latin typeface="IM FELL English" pitchFamily="2" charset="0"/>
               </a:rPr>
-              <a:t> </a:t>
-            </a:r>
-            <a:r>
-              <a:rPr lang="hu-HU" b="1" dirty="0" err="1" smtClean="0">
-                <a:latin typeface="IM FELL English" pitchFamily="2" charset="0"/>
-              </a:rPr>
-              <a:t>database</a:t>
+              <a:t>Frontend</a:t>
             </a:r>
             <a:endParaRPr lang="hu-HU" b="1" dirty="0"/>
           </a:p>
@@ -3993,7 +4175,19 @@
               <a:rPr lang="hu-HU" dirty="0" err="1" smtClean="0">
                 <a:latin typeface="IM FELL English" pitchFamily="2" charset="0"/>
               </a:rPr>
-              <a:t>MariaDB</a:t>
+              <a:t>Angular</a:t>
+            </a:r>
+            <a:r>
+              <a:rPr lang="hu-HU" dirty="0" smtClean="0">
+                <a:latin typeface="IM FELL English" pitchFamily="2" charset="0"/>
+              </a:rPr>
+              <a:t>, </a:t>
+            </a:r>
+            <a:r>
+              <a:rPr lang="hu-HU" dirty="0" err="1" smtClean="0">
+                <a:latin typeface="IM FELL English" pitchFamily="2" charset="0"/>
+              </a:rPr>
+              <a:t>TypeScript</a:t>
             </a:r>
             <a:endParaRPr lang="hu-HU" dirty="0" smtClean="0">
               <a:latin typeface="IM FELL English" pitchFamily="2" charset="0"/>
@@ -4004,7 +4198,7 @@
               <a:rPr lang="hu-HU" dirty="0" err="1" smtClean="0">
                 <a:latin typeface="IM FELL English" pitchFamily="2" charset="0"/>
               </a:rPr>
-              <a:t>Stored</a:t>
+              <a:t>Bootstrap</a:t>
             </a:r>
             <a:r>
               <a:rPr lang="hu-HU" dirty="0" smtClean="0">
@@ -4016,17 +4210,82 @@
               <a:rPr lang="hu-HU" dirty="0" err="1" smtClean="0">
                 <a:latin typeface="IM FELL English" pitchFamily="2" charset="0"/>
               </a:rPr>
-              <a:t>procedures</a:t>
+              <a:t>scss</a:t>
+            </a:r>
+            <a:r>
+              <a:rPr lang="hu-HU" dirty="0" smtClean="0">
+                <a:latin typeface="IM FELL English" pitchFamily="2" charset="0"/>
+              </a:rPr>
+              <a:t> </a:t>
+            </a:r>
+            <a:r>
+              <a:rPr lang="hu-HU" dirty="0" err="1" smtClean="0">
+                <a:latin typeface="IM FELL English" pitchFamily="2" charset="0"/>
+              </a:rPr>
+              <a:t>directory</a:t>
             </a:r>
             <a:endParaRPr lang="hu-HU" dirty="0" smtClean="0">
               <a:latin typeface="IM FELL English" pitchFamily="2" charset="0"/>
             </a:endParaRPr>
           </a:p>
+          <a:p>
+            <a:r>
+              <a:rPr lang="hu-HU" dirty="0" smtClean="0">
+                <a:latin typeface="IM FELL English" pitchFamily="2" charset="0"/>
+              </a:rPr>
+              <a:t>Mobile and computer </a:t>
+            </a:r>
+            <a:r>
+              <a:rPr lang="hu-HU" dirty="0" err="1" smtClean="0">
+                <a:latin typeface="IM FELL English" pitchFamily="2" charset="0"/>
+              </a:rPr>
+              <a:t>view</a:t>
+            </a:r>
+            <a:endParaRPr lang="hu-HU" dirty="0" smtClean="0">
+              <a:latin typeface="IM FELL English" pitchFamily="2" charset="0"/>
+            </a:endParaRPr>
+          </a:p>
+          <a:p>
+            <a:r>
+              <a:rPr lang="hu-HU" dirty="0" err="1" smtClean="0">
+                <a:latin typeface="IM FELL English" pitchFamily="2" charset="0"/>
+              </a:rPr>
+              <a:t>Components</a:t>
+            </a:r>
+            <a:endParaRPr lang="hu-HU" dirty="0" smtClean="0">
+              <a:latin typeface="IM FELL English" pitchFamily="2" charset="0"/>
+            </a:endParaRPr>
+          </a:p>
+          <a:p>
+            <a:r>
+              <a:rPr lang="hu-HU" dirty="0" err="1" smtClean="0">
+                <a:latin typeface="IM FELL English" pitchFamily="2" charset="0"/>
+              </a:rPr>
+              <a:t>HttpClient</a:t>
+            </a:r>
+            <a:r>
+              <a:rPr lang="hu-HU" dirty="0" smtClean="0">
+                <a:latin typeface="IM FELL English" pitchFamily="2" charset="0"/>
+              </a:rPr>
+              <a:t> service</a:t>
+            </a:r>
+          </a:p>
+          <a:p>
+            <a:r>
+              <a:rPr lang="hu-HU" dirty="0" err="1" smtClean="0">
+                <a:latin typeface="IM FELL English" pitchFamily="2" charset="0"/>
+              </a:rPr>
+              <a:t>Validation</a:t>
+            </a:r>
+            <a:endParaRPr lang="hu-HU" dirty="0">
+              <a:latin typeface="IM FELL English" pitchFamily="2" charset="0"/>
+            </a:endParaRPr>
+          </a:p>
         </p:txBody>
       </p:sp>
       <p:pic>
         <p:nvPicPr>
-          <p:cNvPr id="5" name="Tartalom helye 4" descr="tárolt eljárás.png"/>
+          <p:cNvPr id="7" name="Tartalom helye 6" descr="http get.png"/>
           <p:cNvPicPr>
             <a:picLocks noGrp="1" noChangeAspect="1"/>
           </p:cNvPicPr>
@@ -4042,8 +4301,8 @@
         </p:blipFill>
         <p:spPr>
           <a:xfrm>
-            <a:off x="4834731" y="2582910"/>
-            <a:ext cx="3665538" cy="2560542"/>
+            <a:off x="4500562" y="2357430"/>
+            <a:ext cx="4357717" cy="2214577"/>
           </a:xfrm>
         </p:spPr>
       </p:pic>
@@ -4084,65 +4343,104 @@
         </p:nvSpPr>
         <p:spPr/>
         <p:txBody>
-          <a:bodyPr/>
-          <a:lstStyle/>
-          <a:p>
+          <a:bodyPr>
+            <a:normAutofit/>
+          </a:bodyPr>
+          <a:lstStyle/>
+          <a:p>
+            <a:r>
+              <a:rPr lang="hu-HU" b="1" dirty="0" err="1" smtClean="0">
+                <a:latin typeface="IM FELL English" pitchFamily="2" charset="0"/>
+              </a:rPr>
+              <a:t>MySQL</a:t>
+            </a:r>
             <a:r>
               <a:rPr lang="hu-HU" b="1" dirty="0" smtClean="0">
                 <a:latin typeface="IM FELL English" pitchFamily="2" charset="0"/>
               </a:rPr>
-              <a:t>Data </a:t>
+              <a:t> </a:t>
             </a:r>
             <a:r>
               <a:rPr lang="hu-HU" b="1" dirty="0" err="1" smtClean="0">
                 <a:latin typeface="IM FELL English" pitchFamily="2" charset="0"/>
               </a:rPr>
-              <a:t>model</a:t>
-            </a:r>
-            <a:r>
-              <a:rPr lang="hu-HU" b="1" dirty="0" smtClean="0">
-                <a:latin typeface="IM FELL English" pitchFamily="2" charset="0"/>
-              </a:rPr>
-              <a:t> </a:t>
-            </a:r>
-            <a:r>
-              <a:rPr lang="hu-HU" b="1" dirty="0" err="1" smtClean="0">
-                <a:latin typeface="IM FELL English" pitchFamily="2" charset="0"/>
-              </a:rPr>
-              <a:t>tables</a:t>
-            </a:r>
-            <a:endParaRPr lang="hu-HU" b="1" dirty="0">
+              <a:t>database</a:t>
+            </a:r>
+            <a:endParaRPr lang="hu-HU" b="1" dirty="0"/>
+          </a:p>
+        </p:txBody>
+      </p:sp>
+      <p:sp>
+        <p:nvSpPr>
+          <p:cNvPr id="3" name="Tartalom helye 2"/>
+          <p:cNvSpPr>
+            <a:spLocks noGrp="1"/>
+          </p:cNvSpPr>
+          <p:nvPr>
+            <p:ph sz="half" idx="1"/>
+          </p:nvPr>
+        </p:nvSpPr>
+        <p:spPr/>
+        <p:txBody>
+          <a:bodyPr/>
+          <a:lstStyle/>
+          <a:p>
+            <a:r>
+              <a:rPr lang="hu-HU" dirty="0" err="1" smtClean="0">
+                <a:latin typeface="IM FELL English" pitchFamily="2" charset="0"/>
+              </a:rPr>
+              <a:t>MariaDB</a:t>
+            </a:r>
+            <a:endParaRPr lang="hu-HU" dirty="0" smtClean="0">
               <a:latin typeface="IM FELL English" pitchFamily="2" charset="0"/>
             </a:endParaRPr>
           </a:p>
+          <a:p>
+            <a:r>
+              <a:rPr lang="hu-HU" dirty="0" err="1" smtClean="0">
+                <a:latin typeface="IM FELL English" pitchFamily="2" charset="0"/>
+              </a:rPr>
+              <a:t>Stored</a:t>
+            </a:r>
+            <a:r>
+              <a:rPr lang="hu-HU" dirty="0" smtClean="0">
+                <a:latin typeface="IM FELL English" pitchFamily="2" charset="0"/>
+              </a:rPr>
+              <a:t> </a:t>
+            </a:r>
+            <a:r>
+              <a:rPr lang="hu-HU" dirty="0" err="1" smtClean="0">
+                <a:latin typeface="IM FELL English" pitchFamily="2" charset="0"/>
+              </a:rPr>
+              <a:t>procedures</a:t>
+            </a:r>
+            <a:endParaRPr lang="hu-HU" dirty="0" smtClean="0">
+              <a:latin typeface="IM FELL English" pitchFamily="2" charset="0"/>
+            </a:endParaRPr>
+          </a:p>
         </p:txBody>
       </p:sp>
       <p:pic>
         <p:nvPicPr>
-          <p:cNvPr id="3" name="Kép 2" descr="A képen szöveg, beltéri, képernyőkép látható&#10;&#10;Automatikusan generált leírás"/>
-          <p:cNvPicPr/>
-          <p:nvPr/>
+          <p:cNvPr id="5" name="Tartalom helye 4" descr="tárolt eljárás.png"/>
+          <p:cNvPicPr>
+            <a:picLocks noGrp="1" noChangeAspect="1"/>
+          </p:cNvPicPr>
+          <p:nvPr>
+            <p:ph sz="half" idx="2"/>
+          </p:nvPr>
         </p:nvPicPr>
         <p:blipFill>
-          <a:blip r:embed="rId2" cstate="print">
-            <a:extLst>
-              <a:ext uri="{28A0092B-C50C-407E-A947-70E740481C1C}">
-                <a14:useLocalDpi xmlns="" xmlns:wpc="http://schemas.microsoft.com/office/word/2010/wordprocessingCanvas" xmlns:cx="http://schemas.microsoft.com/office/drawing/2014/chartex" xmlns:cx1="http://schemas.microsoft.com/office/drawing/2015/9/8/chartex" xmlns:mc="http://schemas.openxmlformats.org/markup-compatibility/2006" xmlns:o="urn:schemas-microsoft-com:office:office" xmlns:m="http://schemas.openxmlformats.org/officeDocument/2006/math" xmlns:v="urn:schemas-microsoft-com:vml" xmlns:wp14="http://schemas.microsoft.com/office/word/2010/wordprocessingDrawing" xmlns:wp="http://schemas.openxmlformats.org/drawingml/2006/wordprocessingDrawing" xmlns:w10="urn:schemas-microsoft-com:office:word" xmlns:w="http://schemas.openxmlformats.org/wordprocessingml/2006/main" xmlns:w14="http://schemas.microsoft.com/office/word/2010/wordml" xmlns:w15="http://schemas.microsoft.com/office/word/2012/wordml" xmlns:w16se="http://schemas.microsoft.com/office/word/2015/wordml/symex" xmlns:wpg="http://schemas.microsoft.com/office/word/2010/wordprocessingGroup" xmlns:wpi="http://schemas.microsoft.com/office/word/2010/wordprocessingInk" xmlns:wne="http://schemas.microsoft.com/office/word/2006/wordml" xmlns:wps="http://schemas.microsoft.com/office/word/2010/wordprocessingShape" xmlns:a14="http://schemas.microsoft.com/office/drawing/2010/main" xmlns:pic="http://schemas.openxmlformats.org/drawingml/2006/picture" xmlns:lc="http://schemas.openxmlformats.org/drawingml/2006/lockedCanvas" val="0"/>
-              </a:ext>
-            </a:extLst>
-          </a:blip>
+          <a:blip r:embed="rId2"/>
           <a:stretch>
             <a:fillRect/>
           </a:stretch>
         </p:blipFill>
         <p:spPr>
           <a:xfrm>
-            <a:off x="428596" y="1357298"/>
-            <a:ext cx="8286808" cy="5143536"/>
+            <a:off x="4834731" y="2582910"/>
+            <a:ext cx="3665538" cy="2560542"/>
           </a:xfrm>
-          <a:prstGeom prst="rect">
-            <a:avLst/>
-          </a:prstGeom>
         </p:spPr>
       </p:pic>
     </p:spTree>
@@ -4177,13 +4475,144 @@
             <a:spLocks noGrp="1"/>
           </p:cNvSpPr>
           <p:nvPr>
-            <p:ph type="ctrTitle"/>
-          </p:nvPr>
-        </p:nvSpPr>
+            <p:ph type="title"/>
+          </p:nvPr>
+        </p:nvSpPr>
+        <p:spPr/>
+        <p:txBody>
+          <a:bodyPr/>
+          <a:lstStyle/>
+          <a:p>
+            <a:r>
+              <a:rPr lang="hu-HU" b="1" dirty="0" smtClean="0">
+                <a:latin typeface="IM FELL English" pitchFamily="2" charset="0"/>
+              </a:rPr>
+              <a:t>Data </a:t>
+            </a:r>
+            <a:r>
+              <a:rPr lang="hu-HU" b="1" dirty="0" err="1" smtClean="0">
+                <a:latin typeface="IM FELL English" pitchFamily="2" charset="0"/>
+              </a:rPr>
+              <a:t>model</a:t>
+            </a:r>
+            <a:r>
+              <a:rPr lang="hu-HU" b="1" dirty="0" smtClean="0">
+                <a:latin typeface="IM FELL English" pitchFamily="2" charset="0"/>
+              </a:rPr>
+              <a:t> </a:t>
+            </a:r>
+            <a:r>
+              <a:rPr lang="hu-HU" b="1" dirty="0" err="1" smtClean="0">
+                <a:latin typeface="IM FELL English" pitchFamily="2" charset="0"/>
+              </a:rPr>
+              <a:t>tables</a:t>
+            </a:r>
+            <a:endParaRPr lang="hu-HU" b="1" dirty="0">
+              <a:latin typeface="IM FELL English" pitchFamily="2" charset="0"/>
+            </a:endParaRPr>
+          </a:p>
+        </p:txBody>
+      </p:sp>
+      <p:pic>
+        <p:nvPicPr>
+          <p:cNvPr id="3" name="Kép 2" descr="A képen szöveg, beltéri, képernyőkép látható&#10;&#10;Automatikusan generált leírás"/>
+          <p:cNvPicPr/>
+          <p:nvPr/>
+        </p:nvPicPr>
+        <p:blipFill>
+          <a:blip r:embed="rId2" cstate="print">
+            <a:extLst>
+              <a:ext uri="{28A0092B-C50C-407E-A947-70E740481C1C}">
+                <a14:useLocalDpi xmlns:lc="http://schemas.openxmlformats.org/drawingml/2006/lockedCanvas" xmlns:pic="http://schemas.openxmlformats.org/drawingml/2006/picture" xmlns:a14="http://schemas.microsoft.com/office/drawing/2010/main" xmlns:wps="http://schemas.microsoft.com/office/word/2010/wordprocessingShape" xmlns:wne="http://schemas.microsoft.com/office/word/2006/wordml" xmlns:wpi="http://schemas.microsoft.com/office/word/2010/wordprocessingInk" xmlns:wpg="http://schemas.microsoft.com/office/word/2010/wordprocessingGroup" xmlns:w16se="http://schemas.microsoft.com/office/word/2015/wordml/symex" xmlns:w15="http://schemas.microsoft.com/office/word/2012/wordml" xmlns:w14="http://schemas.microsoft.com/office/word/2010/wordml" xmlns:w="http://schemas.openxmlformats.org/wordprocessingml/2006/main" xmlns:w10="urn:schemas-microsoft-com:office:word" xmlns:wp="http://schemas.openxmlformats.org/drawingml/2006/wordprocessingDrawing" xmlns:wp14="http://schemas.microsoft.com/office/word/2010/wordprocessingDrawing" xmlns:v="urn:schemas-microsoft-com:vml" xmlns:m="http://schemas.openxmlformats.org/officeDocument/2006/math" xmlns:o="urn:schemas-microsoft-com:office:office" xmlns:mc="http://schemas.openxmlformats.org/markup-compatibility/2006" xmlns:cx1="http://schemas.microsoft.com/office/drawing/2015/9/8/chartex" xmlns:cx="http://schemas.microsoft.com/office/drawing/2014/chartex" xmlns:wpc="http://schemas.microsoft.com/office/word/2010/wordprocessingCanvas" xmlns="" val="0"/>
+              </a:ext>
+            </a:extLst>
+          </a:blip>
+          <a:stretch>
+            <a:fillRect/>
+          </a:stretch>
+        </p:blipFill>
         <p:spPr>
           <a:xfrm>
-            <a:off x="685800" y="2714620"/>
-            <a:ext cx="7772400" cy="1428760"/>
+            <a:off x="428596" y="1357298"/>
+            <a:ext cx="8286808" cy="5143536"/>
+          </a:xfrm>
+          <a:prstGeom prst="rect">
+            <a:avLst/>
+          </a:prstGeom>
+        </p:spPr>
+      </p:pic>
+    </p:spTree>
+  </p:cSld>
+  <p:clrMapOvr>
+    <a:masterClrMapping/>
+  </p:clrMapOvr>
+</p:sld>
+</file>
+
+<file path=ppt/slides/slide9.xml><?xml version="1.0" encoding="utf-8"?>
+<p:sld xmlns:a="http://schemas.openxmlformats.org/drawingml/2006/main" xmlns:r="http://schemas.openxmlformats.org/officeDocument/2006/relationships" xmlns:p="http://schemas.openxmlformats.org/presentationml/2006/main">
+  <p:cSld>
+    <p:spTree>
+      <p:nvGrpSpPr>
+        <p:cNvPr id="1" name=""/>
+        <p:cNvGrpSpPr/>
+        <p:nvPr/>
+      </p:nvGrpSpPr>
+      <p:grpSpPr>
+        <a:xfrm>
+          <a:off x="0" y="0"/>
+          <a:ext cx="0" cy="0"/>
+          <a:chOff x="0" y="0"/>
+          <a:chExt cx="0" cy="0"/>
+        </a:xfrm>
+      </p:grpSpPr>
+      <p:sp>
+        <p:nvSpPr>
+          <p:cNvPr id="2" name="Cím 1"/>
+          <p:cNvSpPr>
+            <a:spLocks noGrp="1"/>
+          </p:cNvSpPr>
+          <p:nvPr>
+            <p:ph type="title"/>
+          </p:nvPr>
+        </p:nvSpPr>
+        <p:spPr/>
+        <p:txBody>
+          <a:bodyPr/>
+          <a:lstStyle/>
+          <a:p>
+            <a:r>
+              <a:rPr lang="hu-HU" b="1" dirty="0" err="1" smtClean="0">
+                <a:latin typeface="IM FELL English" pitchFamily="2" charset="0"/>
+              </a:rPr>
+              <a:t>Division</a:t>
+            </a:r>
+            <a:r>
+              <a:rPr lang="hu-HU" b="1" dirty="0" smtClean="0">
+                <a:latin typeface="IM FELL English" pitchFamily="2" charset="0"/>
+              </a:rPr>
+              <a:t> of labor</a:t>
+            </a:r>
+            <a:endParaRPr lang="hu-HU" b="1" dirty="0">
+              <a:latin typeface="IM FELL English" pitchFamily="2" charset="0"/>
+            </a:endParaRPr>
+          </a:p>
+        </p:txBody>
+      </p:sp>
+      <p:sp>
+        <p:nvSpPr>
+          <p:cNvPr id="3" name="Tartalom helye 2"/>
+          <p:cNvSpPr>
+            <a:spLocks noGrp="1"/>
+          </p:cNvSpPr>
+          <p:nvPr>
+            <p:ph sz="half" idx="1"/>
+          </p:nvPr>
+        </p:nvSpPr>
+        <p:spPr>
+          <a:xfrm>
+            <a:off x="457200" y="1600200"/>
+            <a:ext cx="6615130" cy="4525963"/>
           </a:xfrm>
         </p:spPr>
         <p:txBody>
@@ -4191,17 +4620,32 @@
           <a:lstStyle/>
           <a:p>
             <a:r>
+              <a:rPr lang="en-US" dirty="0" err="1" smtClean="0">
+                <a:latin typeface="IM FELL English" pitchFamily="2" charset="0"/>
+              </a:rPr>
+              <a:t>Github</a:t>
+            </a:r>
+            <a:endParaRPr lang="en-US" dirty="0" smtClean="0">
+              <a:latin typeface="IM FELL English" pitchFamily="2" charset="0"/>
+            </a:endParaRPr>
+          </a:p>
+          <a:p>
+            <a:r>
               <a:rPr lang="en-US" dirty="0" smtClean="0">
                 <a:latin typeface="IM FELL English" pitchFamily="2" charset="0"/>
               </a:rPr>
-              <a:t>Thank you for your attention</a:t>
-            </a:r>
-            <a:r>
-              <a:rPr lang="hu-HU" dirty="0" smtClean="0">
-                <a:latin typeface="IM FELL English" pitchFamily="2" charset="0"/>
-              </a:rPr>
-              <a:t>!</a:t>
-            </a:r>
+              <a:t>Division of labor based on functions and operational processes</a:t>
+            </a:r>
+          </a:p>
+          <a:p>
+            <a:r>
+              <a:rPr lang="en-US" dirty="0" smtClean="0">
+                <a:latin typeface="IM FELL English" pitchFamily="2" charset="0"/>
+              </a:rPr>
+              <a:t>We both worked on the backend and frontend</a:t>
+            </a:r>
+          </a:p>
+          <a:p>
             <a:endParaRPr lang="hu-HU" dirty="0">
               <a:latin typeface="IM FELL English" pitchFamily="2" charset="0"/>
             </a:endParaRPr>

</xml_diff>